<commit_message>
added shiny link to pppt
</commit_message>
<xml_diff>
--- a/jonharris_rshiny_project_PPT.pptx
+++ b/jonharris_rshiny_project_PPT.pptx
@@ -15333,12 +15333,18 @@
         </p:nvSpPr>
         <p:spPr/>
         <p:txBody>
-          <a:bodyPr/>
+          <a:bodyPr>
+            <a:normAutofit fontScale="70000" lnSpcReduction="20000"/>
+          </a:bodyPr>
           <a:lstStyle/>
           <a:p>
             <a:r>
+              <a:rPr lang="en-US" dirty="0" err="1"/>
+              <a:t>Rshiny</a:t>
+            </a:r>
+            <a:r>
               <a:rPr lang="en-US" dirty="0"/>
-              <a:t>LinkedIn</a:t>
+              <a:t> App</a:t>
             </a:r>
           </a:p>
           <a:p>
@@ -15356,7 +15362,7 @@
                   </a:extLst>
                 </a:hlinkClick>
               </a:rPr>
-              <a:t>https://www.linkedin.com/in/jonharriseit</a:t>
+              <a:t>https://jah377.shinyapps.io/NYCDSA_doctorpayments_jonharris_rshinyapp/</a:t>
             </a:r>
             <a:endParaRPr lang="en-US" dirty="0">
               <a:solidFill>
@@ -15365,9 +15371,13 @@
             </a:endParaRPr>
           </a:p>
           <a:p>
+            <a:pPr lvl="1"/>
+            <a:endParaRPr lang="en-US" dirty="0"/>
+          </a:p>
+          <a:p>
             <a:r>
               <a:rPr lang="en-US" dirty="0"/>
-              <a:t>GitHub</a:t>
+              <a:t>LinkedIn</a:t>
             </a:r>
           </a:p>
           <a:p>
@@ -15385,7 +15395,7 @@
                   </a:extLst>
                 </a:hlinkClick>
               </a:rPr>
-              <a:t>https://github.com/jah377</a:t>
+              <a:t>https://www.linkedin.com/in/jonharriseit</a:t>
             </a:r>
             <a:endParaRPr lang="en-US" dirty="0">
               <a:solidFill>
@@ -15394,9 +15404,19 @@
             </a:endParaRPr>
           </a:p>
           <a:p>
+            <a:pPr marL="457200" lvl="1" indent="0">
+              <a:buNone/>
+            </a:pPr>
+            <a:endParaRPr lang="en-US" dirty="0">
+              <a:solidFill>
+                <a:schemeClr val="accent1"/>
+              </a:solidFill>
+            </a:endParaRPr>
+          </a:p>
+          <a:p>
             <a:r>
               <a:rPr lang="en-US" dirty="0"/>
-              <a:t>ResearchGate</a:t>
+              <a:t>GitHub</a:t>
             </a:r>
           </a:p>
           <a:p>
@@ -15407,6 +15427,45 @@
                   <a:schemeClr val="accent1"/>
                 </a:solidFill>
                 <a:hlinkClick r:id="rId4">
+                  <a:extLst>
+                    <a:ext uri="{A12FA001-AC4F-418D-AE19-62706E023703}">
+                      <ahyp:hlinkClr xmlns:ahyp="http://schemas.microsoft.com/office/drawing/2018/hyperlinkcolor" val="tx"/>
+                    </a:ext>
+                  </a:extLst>
+                </a:hlinkClick>
+              </a:rPr>
+              <a:t>https://github.com/jah377</a:t>
+            </a:r>
+            <a:endParaRPr lang="en-US" dirty="0">
+              <a:solidFill>
+                <a:schemeClr val="accent1"/>
+              </a:solidFill>
+            </a:endParaRPr>
+          </a:p>
+          <a:p>
+            <a:pPr marL="457200" lvl="1" indent="0">
+              <a:buNone/>
+            </a:pPr>
+            <a:endParaRPr lang="en-US" dirty="0">
+              <a:solidFill>
+                <a:schemeClr val="accent1"/>
+              </a:solidFill>
+            </a:endParaRPr>
+          </a:p>
+          <a:p>
+            <a:r>
+              <a:rPr lang="en-US" dirty="0"/>
+              <a:t>ResearchGate</a:t>
+            </a:r>
+          </a:p>
+          <a:p>
+            <a:pPr lvl="1"/>
+            <a:r>
+              <a:rPr lang="en-US" dirty="0">
+                <a:solidFill>
+                  <a:schemeClr val="accent1"/>
+                </a:solidFill>
+                <a:hlinkClick r:id="rId5">
                   <a:extLst>
                     <a:ext uri="{A12FA001-AC4F-418D-AE19-62706E023703}">
                       <ahyp:hlinkClr xmlns:ahyp="http://schemas.microsoft.com/office/drawing/2018/hyperlinkcolor" val="tx"/>

</xml_diff>